<commit_message>
final powerpoint and pdf
</commit_message>
<xml_diff>
--- a/Poster/Poster draft 1.pptx
+++ b/Poster/Poster draft 1.pptx
@@ -1562,7 +1562,6 @@
               <a:rPr lang="nl-NL" b="1" dirty="0"/>
               <a:t>)</a:t>
             </a:r>
-            <a:endParaRPr lang="nl-NL" dirty="0"/>
           </a:p>
           <a:p>
             <a:pPr marL="0" indent="0">
@@ -1570,9 +1569,950 @@
               <a:buNone/>
             </a:pPr>
             <a:r>
-              <a:rPr lang="nl-NL" dirty="0"/>
-              <a:t>-</a:t>
-            </a:r>
+              <a:rPr lang="nl-NL" b="0" dirty="0"/>
+              <a:t>-   </a:t>
+            </a:r>
+            <a:r>
+              <a:rPr lang="nl-NL" b="0" dirty="0" err="1"/>
+              <a:t>What</a:t>
+            </a:r>
+            <a:r>
+              <a:rPr lang="nl-NL" b="0" dirty="0"/>
+              <a:t> is a </a:t>
+            </a:r>
+            <a:r>
+              <a:rPr lang="nl-NL" b="0" dirty="0" err="1"/>
+              <a:t>learning</a:t>
+            </a:r>
+            <a:r>
+              <a:rPr lang="nl-NL" b="0" dirty="0"/>
+              <a:t> </a:t>
+            </a:r>
+            <a:r>
+              <a:rPr lang="nl-NL" b="0" dirty="0" err="1"/>
+              <a:t>rate</a:t>
+            </a:r>
+            <a:r>
+              <a:rPr lang="nl-NL" b="0" dirty="0"/>
+              <a:t>? </a:t>
+            </a:r>
+            <a:r>
+              <a:rPr lang="nl-NL" b="0" dirty="0" err="1"/>
+              <a:t>Why</a:t>
+            </a:r>
+            <a:r>
+              <a:rPr lang="nl-NL" b="0" dirty="0"/>
+              <a:t> important?</a:t>
+            </a:r>
+          </a:p>
+          <a:p>
+            <a:pPr marL="171450" indent="-171450">
+              <a:buFontTx/>
+              <a:buChar char="-"/>
+            </a:pPr>
+            <a:r>
+              <a:rPr lang="nl-NL" dirty="0"/>
+              <a:t>Basic scenario: </a:t>
+            </a:r>
+            <a:r>
+              <a:rPr lang="nl-NL" dirty="0" err="1"/>
+              <a:t>Explanation</a:t>
+            </a:r>
+            <a:r>
+              <a:rPr lang="nl-NL" dirty="0"/>
+              <a:t> </a:t>
+            </a:r>
+            <a:r>
+              <a:rPr lang="nl-NL" dirty="0" err="1"/>
+              <a:t>and</a:t>
+            </a:r>
+            <a:r>
+              <a:rPr lang="nl-NL" dirty="0"/>
+              <a:t> </a:t>
+            </a:r>
+            <a:r>
+              <a:rPr lang="nl-NL" dirty="0" err="1"/>
+              <a:t>motivation</a:t>
+            </a:r>
+            <a:r>
+              <a:rPr lang="nl-NL" dirty="0"/>
+              <a:t> </a:t>
+            </a:r>
+            <a:r>
+              <a:rPr lang="nl-NL" dirty="0" err="1"/>
+              <a:t>for</a:t>
+            </a:r>
+            <a:r>
+              <a:rPr lang="nl-NL" dirty="0"/>
+              <a:t> </a:t>
+            </a:r>
+            <a:r>
+              <a:rPr lang="nl-NL" dirty="0" err="1"/>
+              <a:t>starting</a:t>
+            </a:r>
+            <a:r>
+              <a:rPr lang="nl-NL" dirty="0"/>
+              <a:t> </a:t>
+            </a:r>
+            <a:r>
+              <a:rPr lang="nl-NL" dirty="0" err="1"/>
+              <a:t>with</a:t>
+            </a:r>
+            <a:r>
+              <a:rPr lang="nl-NL" dirty="0"/>
+              <a:t> </a:t>
+            </a:r>
+            <a:r>
+              <a:rPr lang="nl-NL" dirty="0" err="1"/>
+              <a:t>this</a:t>
+            </a:r>
+            <a:endParaRPr lang="nl-NL" dirty="0"/>
+          </a:p>
+          <a:p>
+            <a:pPr marL="171450" indent="-171450">
+              <a:buFontTx/>
+              <a:buChar char="-"/>
+            </a:pPr>
+            <a:r>
+              <a:rPr lang="nl-NL" dirty="0" err="1"/>
+              <a:t>Kill</a:t>
+            </a:r>
+            <a:r>
+              <a:rPr lang="nl-NL" dirty="0"/>
+              <a:t> as </a:t>
+            </a:r>
+            <a:r>
+              <a:rPr lang="nl-NL" dirty="0" err="1"/>
+              <a:t>fast</a:t>
+            </a:r>
+            <a:r>
+              <a:rPr lang="nl-NL" dirty="0"/>
+              <a:t> as </a:t>
+            </a:r>
+            <a:r>
+              <a:rPr lang="nl-NL" dirty="0" err="1"/>
+              <a:t>possible</a:t>
+            </a:r>
+            <a:r>
+              <a:rPr lang="nl-NL" dirty="0"/>
+              <a:t> – </a:t>
+            </a:r>
+            <a:r>
+              <a:rPr lang="nl-NL" dirty="0" err="1"/>
+              <a:t>relate</a:t>
+            </a:r>
+            <a:r>
+              <a:rPr lang="nl-NL" dirty="0"/>
+              <a:t> </a:t>
+            </a:r>
+            <a:r>
+              <a:rPr lang="nl-NL" dirty="0" err="1"/>
+              <a:t>to</a:t>
+            </a:r>
+            <a:r>
+              <a:rPr lang="nl-NL" dirty="0"/>
+              <a:t> </a:t>
+            </a:r>
+            <a:r>
+              <a:rPr lang="nl-NL" dirty="0" err="1"/>
+              <a:t>learning</a:t>
+            </a:r>
+            <a:r>
+              <a:rPr lang="nl-NL" dirty="0"/>
+              <a:t> curve</a:t>
+            </a:r>
+          </a:p>
+          <a:p>
+            <a:pPr marL="171450" indent="-171450">
+              <a:buFontTx/>
+              <a:buChar char="-"/>
+            </a:pPr>
+            <a:r>
+              <a:rPr lang="nl-NL" dirty="0"/>
+              <a:t>Small </a:t>
+            </a:r>
+            <a:r>
+              <a:rPr lang="nl-NL" dirty="0" err="1"/>
+              <a:t>sd</a:t>
+            </a:r>
+            <a:r>
+              <a:rPr lang="nl-NL" dirty="0"/>
+              <a:t> </a:t>
+            </a:r>
+            <a:r>
+              <a:rPr lang="nl-NL" dirty="0" err="1"/>
+              <a:t>for</a:t>
+            </a:r>
+            <a:r>
+              <a:rPr lang="nl-NL" dirty="0"/>
+              <a:t> best </a:t>
+            </a:r>
+            <a:r>
+              <a:rPr lang="nl-NL" dirty="0" err="1"/>
+              <a:t>learning</a:t>
+            </a:r>
+            <a:r>
+              <a:rPr lang="nl-NL" dirty="0"/>
+              <a:t> </a:t>
+            </a:r>
+            <a:r>
+              <a:rPr lang="nl-NL" dirty="0" err="1"/>
+              <a:t>rate</a:t>
+            </a:r>
+            <a:endParaRPr lang="nl-NL" dirty="0"/>
+          </a:p>
+          <a:p>
+            <a:pPr marL="171450" indent="-171450">
+              <a:buFontTx/>
+              <a:buChar char="-"/>
+            </a:pPr>
+            <a:endParaRPr lang="nl-NL" dirty="0"/>
+          </a:p>
+          <a:p>
+            <a:pPr marL="171450" indent="-171450">
+              <a:buFontTx/>
+              <a:buChar char="-"/>
+            </a:pPr>
+            <a:r>
+              <a:rPr lang="nl-NL" dirty="0" err="1"/>
+              <a:t>To</a:t>
+            </a:r>
+            <a:r>
+              <a:rPr lang="nl-NL" dirty="0"/>
+              <a:t> </a:t>
+            </a:r>
+            <a:r>
+              <a:rPr lang="nl-NL" dirty="0" err="1"/>
+              <a:t>confirm</a:t>
+            </a:r>
+            <a:r>
+              <a:rPr lang="nl-NL" dirty="0"/>
+              <a:t>: more </a:t>
+            </a:r>
+            <a:r>
+              <a:rPr lang="nl-NL" dirty="0" err="1"/>
+              <a:t>challenging</a:t>
+            </a:r>
+            <a:r>
+              <a:rPr lang="nl-NL" dirty="0"/>
+              <a:t> scenario &gt; </a:t>
+            </a:r>
+            <a:r>
+              <a:rPr lang="nl-NL" dirty="0" err="1"/>
+              <a:t>rendered</a:t>
+            </a:r>
+            <a:r>
+              <a:rPr lang="nl-NL" dirty="0"/>
+              <a:t> frame</a:t>
+            </a:r>
+          </a:p>
+          <a:p>
+            <a:pPr marL="171450" indent="-171450">
+              <a:buFontTx/>
+              <a:buChar char="-"/>
+            </a:pPr>
+            <a:r>
+              <a:rPr lang="nl-NL" dirty="0"/>
+              <a:t>Intro: </a:t>
+            </a:r>
+            <a:r>
+              <a:rPr lang="nl-NL" dirty="0" err="1"/>
+              <a:t>defend</a:t>
+            </a:r>
+            <a:r>
+              <a:rPr lang="nl-NL" dirty="0"/>
+              <a:t> </a:t>
+            </a:r>
+            <a:r>
+              <a:rPr lang="nl-NL" dirty="0" err="1"/>
+              <a:t>the</a:t>
+            </a:r>
+            <a:r>
+              <a:rPr lang="nl-NL" dirty="0"/>
+              <a:t> line</a:t>
+            </a:r>
+          </a:p>
+          <a:p>
+            <a:pPr marL="171450" indent="-171450">
+              <a:buFontTx/>
+              <a:buChar char="-"/>
+            </a:pPr>
+            <a:r>
+              <a:rPr lang="nl-NL" dirty="0" err="1"/>
+              <a:t>Tendency</a:t>
+            </a:r>
+            <a:r>
+              <a:rPr lang="nl-NL" dirty="0"/>
+              <a:t> </a:t>
+            </a:r>
+            <a:r>
+              <a:rPr lang="nl-NL" dirty="0" err="1"/>
+              <a:t>to</a:t>
+            </a:r>
+            <a:r>
+              <a:rPr lang="nl-NL" dirty="0"/>
+              <a:t> </a:t>
+            </a:r>
+            <a:r>
+              <a:rPr lang="nl-NL" dirty="0" err="1"/>
+              <a:t>shoot</a:t>
+            </a:r>
+            <a:r>
+              <a:rPr lang="nl-NL" dirty="0"/>
+              <a:t> </a:t>
+            </a:r>
+            <a:r>
+              <a:rPr lang="nl-NL" dirty="0" err="1"/>
+              <a:t>wildly</a:t>
+            </a:r>
+            <a:r>
+              <a:rPr lang="nl-NL" dirty="0"/>
+              <a:t> </a:t>
+            </a:r>
+            <a:r>
+              <a:rPr lang="nl-NL" dirty="0" err="1"/>
+              <a:t>and</a:t>
+            </a:r>
+            <a:r>
+              <a:rPr lang="nl-NL" dirty="0"/>
+              <a:t> </a:t>
+            </a:r>
+            <a:r>
+              <a:rPr lang="nl-NL" dirty="0" err="1"/>
+              <a:t>reward</a:t>
+            </a:r>
+            <a:r>
+              <a:rPr lang="nl-NL" dirty="0"/>
+              <a:t> </a:t>
+            </a:r>
+            <a:r>
+              <a:rPr lang="nl-NL" dirty="0" err="1"/>
+              <a:t>shape</a:t>
+            </a:r>
+            <a:endParaRPr lang="nl-NL" dirty="0"/>
+          </a:p>
+          <a:p>
+            <a:pPr marL="171450" indent="-171450">
+              <a:buFontTx/>
+              <a:buChar char="-"/>
+            </a:pPr>
+            <a:endParaRPr lang="nl-NL" dirty="0"/>
+          </a:p>
+          <a:p>
+            <a:pPr marL="171450" indent="-171450">
+              <a:buFontTx/>
+              <a:buChar char="-"/>
+            </a:pPr>
+            <a:r>
+              <a:rPr lang="nl-NL" dirty="0"/>
+              <a:t>A2C </a:t>
+            </a:r>
+            <a:r>
+              <a:rPr lang="nl-NL" dirty="0" err="1"/>
+              <a:t>vs</a:t>
+            </a:r>
+            <a:r>
+              <a:rPr lang="nl-NL" dirty="0"/>
+              <a:t> A3C</a:t>
+            </a:r>
+          </a:p>
+          <a:p>
+            <a:pPr marL="171450" indent="-171450">
+              <a:buFontTx/>
+              <a:buChar char="-"/>
+            </a:pPr>
+            <a:r>
+              <a:rPr lang="nl-NL" dirty="0" err="1"/>
+              <a:t>Similair</a:t>
+            </a:r>
+            <a:r>
+              <a:rPr lang="nl-NL" dirty="0"/>
+              <a:t> curves, long </a:t>
+            </a:r>
+            <a:r>
+              <a:rPr lang="nl-NL" dirty="0" err="1"/>
+              <a:t>wallclock</a:t>
+            </a:r>
+            <a:r>
+              <a:rPr lang="nl-NL" dirty="0"/>
+              <a:t> </a:t>
+            </a:r>
+            <a:r>
+              <a:rPr lang="nl-NL" dirty="0" err="1"/>
+              <a:t>for</a:t>
+            </a:r>
+            <a:r>
+              <a:rPr lang="nl-NL" dirty="0"/>
+              <a:t> A2C</a:t>
+            </a:r>
+          </a:p>
+          <a:p>
+            <a:pPr marL="0" indent="0">
+              <a:buFontTx/>
+              <a:buNone/>
+            </a:pPr>
+            <a:endParaRPr lang="nl-NL" b="1" dirty="0"/>
+          </a:p>
+          <a:p>
+            <a:pPr marL="0" indent="0">
+              <a:buFontTx/>
+              <a:buNone/>
+            </a:pPr>
+            <a:r>
+              <a:rPr lang="nl-NL" b="1" dirty="0"/>
+              <a:t>Batch </a:t>
+            </a:r>
+            <a:r>
+              <a:rPr lang="nl-NL" b="1" dirty="0" err="1"/>
+              <a:t>size</a:t>
+            </a:r>
+            <a:r>
+              <a:rPr lang="nl-NL" b="1" dirty="0"/>
+              <a:t> </a:t>
+            </a:r>
+            <a:r>
+              <a:rPr lang="nl-NL" b="1" dirty="0" err="1"/>
+              <a:t>and</a:t>
+            </a:r>
+            <a:r>
+              <a:rPr lang="nl-NL" b="1" dirty="0"/>
+              <a:t> </a:t>
+            </a:r>
+            <a:r>
+              <a:rPr lang="nl-NL" b="1" dirty="0" err="1"/>
+              <a:t>Optimizers</a:t>
+            </a:r>
+            <a:r>
+              <a:rPr lang="nl-NL" b="1" dirty="0"/>
+              <a:t> </a:t>
+            </a:r>
+            <a:r>
+              <a:rPr lang="nl-NL" b="1" dirty="0" err="1"/>
+              <a:t>and</a:t>
+            </a:r>
+            <a:r>
+              <a:rPr lang="nl-NL" b="1" dirty="0"/>
+              <a:t> </a:t>
+            </a:r>
+            <a:r>
+              <a:rPr lang="nl-NL" b="1" dirty="0" err="1"/>
+              <a:t>conclusions</a:t>
+            </a:r>
+            <a:r>
+              <a:rPr lang="nl-NL" b="1" dirty="0"/>
+              <a:t>/</a:t>
+            </a:r>
+            <a:r>
+              <a:rPr lang="nl-NL" b="1" dirty="0" err="1"/>
+              <a:t>outro</a:t>
+            </a:r>
+            <a:r>
+              <a:rPr lang="nl-NL" b="1" dirty="0"/>
+              <a:t> (Elin)</a:t>
+            </a:r>
+          </a:p>
+          <a:p>
+            <a:pPr marL="171450" indent="-171450">
+              <a:buFontTx/>
+              <a:buChar char="-"/>
+            </a:pPr>
+            <a:r>
+              <a:rPr lang="nl-NL" dirty="0"/>
+              <a:t>Intro batch </a:t>
+            </a:r>
+            <a:r>
+              <a:rPr lang="nl-NL" dirty="0" err="1"/>
+              <a:t>size</a:t>
+            </a:r>
+            <a:endParaRPr lang="nl-NL" dirty="0"/>
+          </a:p>
+          <a:p>
+            <a:pPr marL="171450" indent="-171450">
+              <a:buFontTx/>
+              <a:buChar char="-"/>
+            </a:pPr>
+            <a:r>
+              <a:rPr lang="nl-NL" dirty="0"/>
+              <a:t>Intro scenario -&gt; </a:t>
+            </a:r>
+            <a:r>
+              <a:rPr lang="nl-NL" dirty="0" err="1"/>
+              <a:t>delayed</a:t>
+            </a:r>
+            <a:r>
+              <a:rPr lang="nl-NL" dirty="0"/>
+              <a:t> </a:t>
+            </a:r>
+            <a:r>
+              <a:rPr lang="nl-NL" dirty="0" err="1"/>
+              <a:t>and</a:t>
+            </a:r>
+            <a:r>
+              <a:rPr lang="nl-NL" dirty="0"/>
+              <a:t> </a:t>
+            </a:r>
+            <a:r>
+              <a:rPr lang="nl-NL" dirty="0" err="1"/>
+              <a:t>sparse</a:t>
+            </a:r>
+            <a:r>
+              <a:rPr lang="nl-NL" dirty="0"/>
+              <a:t> </a:t>
+            </a:r>
+            <a:r>
+              <a:rPr lang="nl-NL" dirty="0" err="1"/>
+              <a:t>reward</a:t>
+            </a:r>
+            <a:r>
+              <a:rPr lang="nl-NL" dirty="0"/>
+              <a:t>, </a:t>
+            </a:r>
+            <a:r>
+              <a:rPr lang="nl-NL" dirty="0" err="1"/>
+              <a:t>estimate</a:t>
+            </a:r>
+            <a:r>
+              <a:rPr lang="nl-NL" dirty="0"/>
+              <a:t> </a:t>
+            </a:r>
+            <a:r>
+              <a:rPr lang="nl-NL" dirty="0" err="1"/>
+              <a:t>position</a:t>
+            </a:r>
+            <a:endParaRPr lang="nl-NL" dirty="0"/>
+          </a:p>
+          <a:p>
+            <a:pPr marL="171450" indent="-171450">
+              <a:buFontTx/>
+              <a:buChar char="-"/>
+            </a:pPr>
+            <a:r>
+              <a:rPr lang="nl-NL" dirty="0"/>
+              <a:t>In </a:t>
+            </a:r>
+            <a:r>
+              <a:rPr lang="nl-NL" dirty="0" err="1"/>
+              <a:t>other</a:t>
+            </a:r>
+            <a:r>
+              <a:rPr lang="nl-NL" dirty="0"/>
+              <a:t> </a:t>
+            </a:r>
+            <a:r>
+              <a:rPr lang="nl-NL" dirty="0" err="1"/>
+              <a:t>scenarios</a:t>
+            </a:r>
+            <a:r>
+              <a:rPr lang="nl-NL" dirty="0"/>
+              <a:t>, standard batch </a:t>
+            </a:r>
+            <a:r>
+              <a:rPr lang="nl-NL" dirty="0" err="1"/>
+              <a:t>size</a:t>
+            </a:r>
+            <a:r>
+              <a:rPr lang="nl-NL" dirty="0"/>
+              <a:t> 10</a:t>
+            </a:r>
+          </a:p>
+          <a:p>
+            <a:pPr marL="171450" indent="-171450">
+              <a:buFontTx/>
+              <a:buChar char="-"/>
+            </a:pPr>
+            <a:r>
+              <a:rPr lang="nl-NL" dirty="0" err="1"/>
+              <a:t>Since</a:t>
+            </a:r>
+            <a:r>
+              <a:rPr lang="nl-NL" dirty="0"/>
+              <a:t> </a:t>
+            </a:r>
+            <a:r>
+              <a:rPr lang="nl-NL" dirty="0" err="1"/>
+              <a:t>sparse</a:t>
+            </a:r>
+            <a:r>
+              <a:rPr lang="nl-NL" dirty="0"/>
+              <a:t> </a:t>
+            </a:r>
+            <a:r>
+              <a:rPr lang="nl-NL" dirty="0" err="1"/>
+              <a:t>reward</a:t>
+            </a:r>
+            <a:r>
+              <a:rPr lang="nl-NL" dirty="0"/>
+              <a:t> </a:t>
+            </a:r>
+            <a:r>
+              <a:rPr lang="nl-NL" dirty="0" err="1"/>
+              <a:t>so</a:t>
+            </a:r>
+            <a:r>
+              <a:rPr lang="nl-NL" dirty="0"/>
+              <a:t> </a:t>
+            </a:r>
+            <a:r>
+              <a:rPr lang="nl-NL" dirty="0" err="1"/>
+              <a:t>sometimes</a:t>
+            </a:r>
+            <a:r>
+              <a:rPr lang="nl-NL" dirty="0"/>
+              <a:t> no </a:t>
+            </a:r>
+            <a:r>
+              <a:rPr lang="nl-NL" dirty="0" err="1"/>
+              <a:t>reward</a:t>
+            </a:r>
+            <a:r>
+              <a:rPr lang="nl-NL" dirty="0"/>
+              <a:t>, </a:t>
+            </a:r>
+            <a:r>
+              <a:rPr lang="nl-NL" dirty="0" err="1"/>
+              <a:t>larger</a:t>
+            </a:r>
+            <a:r>
+              <a:rPr lang="nl-NL" dirty="0"/>
+              <a:t> </a:t>
+            </a:r>
+            <a:r>
+              <a:rPr lang="nl-NL" dirty="0" err="1"/>
+              <a:t>batchsize</a:t>
+            </a:r>
+            <a:r>
+              <a:rPr lang="nl-NL" dirty="0"/>
+              <a:t> </a:t>
+            </a:r>
+            <a:r>
+              <a:rPr lang="nl-NL" dirty="0" err="1"/>
+              <a:t>needed</a:t>
+            </a:r>
+            <a:endParaRPr lang="nl-NL" dirty="0"/>
+          </a:p>
+          <a:p>
+            <a:pPr marL="171450" indent="-171450">
+              <a:buFontTx/>
+              <a:buChar char="-"/>
+            </a:pPr>
+            <a:endParaRPr lang="nl-NL" dirty="0"/>
+          </a:p>
+          <a:p>
+            <a:pPr marL="171450" indent="-171450">
+              <a:buFontTx/>
+              <a:buChar char="-"/>
+            </a:pPr>
+            <a:r>
+              <a:rPr lang="nl-NL" dirty="0" err="1"/>
+              <a:t>So</a:t>
+            </a:r>
+            <a:r>
+              <a:rPr lang="nl-NL" dirty="0"/>
+              <a:t> far: </a:t>
+            </a:r>
+            <a:r>
+              <a:rPr lang="nl-NL" dirty="0" err="1"/>
+              <a:t>all</a:t>
+            </a:r>
+            <a:r>
+              <a:rPr lang="nl-NL" dirty="0"/>
+              <a:t> Adam </a:t>
+            </a:r>
+            <a:r>
+              <a:rPr lang="nl-NL" dirty="0" err="1"/>
+              <a:t>because</a:t>
+            </a:r>
+            <a:r>
+              <a:rPr lang="nl-NL" dirty="0"/>
+              <a:t> </a:t>
+            </a:r>
+            <a:r>
+              <a:rPr lang="nl-NL" dirty="0" err="1"/>
+              <a:t>recommended</a:t>
+            </a:r>
+            <a:endParaRPr lang="nl-NL" dirty="0"/>
+          </a:p>
+          <a:p>
+            <a:pPr marL="171450" indent="-171450">
+              <a:buFontTx/>
+              <a:buChar char="-"/>
+            </a:pPr>
+            <a:r>
+              <a:rPr lang="nl-NL" dirty="0"/>
+              <a:t>Intro </a:t>
+            </a:r>
+            <a:r>
+              <a:rPr lang="nl-NL" dirty="0" err="1"/>
+              <a:t>Optimizers</a:t>
+            </a:r>
+            <a:r>
+              <a:rPr lang="nl-NL" dirty="0"/>
+              <a:t>, momentum </a:t>
+            </a:r>
+            <a:r>
+              <a:rPr lang="nl-NL" dirty="0" err="1"/>
+              <a:t>and</a:t>
+            </a:r>
+            <a:r>
+              <a:rPr lang="nl-NL" dirty="0"/>
+              <a:t> </a:t>
+            </a:r>
+            <a:r>
+              <a:rPr lang="nl-NL" dirty="0" err="1"/>
+              <a:t>decay</a:t>
+            </a:r>
+            <a:endParaRPr lang="nl-NL" dirty="0"/>
+          </a:p>
+          <a:p>
+            <a:pPr marL="171450" indent="-171450">
+              <a:buFontTx/>
+              <a:buChar char="-"/>
+            </a:pPr>
+            <a:r>
+              <a:rPr lang="nl-NL" dirty="0"/>
+              <a:t>Intro </a:t>
+            </a:r>
+            <a:r>
+              <a:rPr lang="nl-NL" dirty="0" err="1"/>
+              <a:t>Defend</a:t>
+            </a:r>
+            <a:r>
+              <a:rPr lang="nl-NL" dirty="0"/>
+              <a:t> </a:t>
+            </a:r>
+            <a:r>
+              <a:rPr lang="nl-NL" dirty="0" err="1"/>
+              <a:t>the</a:t>
+            </a:r>
+            <a:r>
+              <a:rPr lang="nl-NL" dirty="0"/>
+              <a:t> center</a:t>
+            </a:r>
+          </a:p>
+          <a:p>
+            <a:pPr marL="171450" indent="-171450">
+              <a:buFontTx/>
+              <a:buChar char="-"/>
+            </a:pPr>
+            <a:r>
+              <a:rPr lang="nl-NL" dirty="0"/>
+              <a:t>Adam </a:t>
+            </a:r>
+            <a:r>
+              <a:rPr lang="nl-NL" dirty="0" err="1"/>
+              <a:t>outperforms</a:t>
+            </a:r>
+            <a:r>
+              <a:rPr lang="nl-NL" dirty="0"/>
+              <a:t>, </a:t>
+            </a:r>
+            <a:r>
+              <a:rPr lang="nl-NL" dirty="0" err="1"/>
+              <a:t>so</a:t>
+            </a:r>
+            <a:r>
+              <a:rPr lang="nl-NL" dirty="0"/>
+              <a:t> </a:t>
+            </a:r>
+            <a:r>
+              <a:rPr lang="nl-NL" dirty="0" err="1"/>
+              <a:t>good</a:t>
+            </a:r>
+            <a:r>
+              <a:rPr lang="nl-NL" dirty="0"/>
+              <a:t> </a:t>
+            </a:r>
+            <a:r>
+              <a:rPr lang="nl-NL" dirty="0" err="1"/>
+              <a:t>inital</a:t>
+            </a:r>
+            <a:r>
+              <a:rPr lang="nl-NL" dirty="0"/>
+              <a:t> </a:t>
+            </a:r>
+            <a:r>
+              <a:rPr lang="nl-NL" dirty="0" err="1"/>
+              <a:t>choice</a:t>
+            </a:r>
+            <a:endParaRPr lang="nl-NL" dirty="0"/>
+          </a:p>
+          <a:p>
+            <a:pPr marL="171450" indent="-171450">
+              <a:buFontTx/>
+              <a:buChar char="-"/>
+            </a:pPr>
+            <a:endParaRPr lang="nl-NL" dirty="0"/>
+          </a:p>
+          <a:p>
+            <a:pPr marL="171450" indent="-171450">
+              <a:buFontTx/>
+              <a:buChar char="-"/>
+            </a:pPr>
+            <a:r>
+              <a:rPr lang="nl-NL" dirty="0" err="1"/>
+              <a:t>Good</a:t>
+            </a:r>
+            <a:r>
+              <a:rPr lang="nl-NL" dirty="0"/>
+              <a:t> performance on </a:t>
+            </a:r>
+            <a:r>
+              <a:rPr lang="nl-NL" dirty="0" err="1"/>
+              <a:t>all</a:t>
+            </a:r>
+            <a:r>
+              <a:rPr lang="nl-NL" dirty="0"/>
+              <a:t> </a:t>
+            </a:r>
+            <a:r>
+              <a:rPr lang="nl-NL" dirty="0" err="1"/>
+              <a:t>scenarios</a:t>
+            </a:r>
+            <a:endParaRPr lang="nl-NL" dirty="0"/>
+          </a:p>
+          <a:p>
+            <a:pPr marL="171450" indent="-171450">
+              <a:buFontTx/>
+              <a:buChar char="-"/>
+            </a:pPr>
+            <a:r>
+              <a:rPr lang="nl-NL" dirty="0" err="1"/>
+              <a:t>Learned</a:t>
+            </a:r>
+            <a:r>
+              <a:rPr lang="nl-NL" dirty="0"/>
+              <a:t> a lot </a:t>
+            </a:r>
+            <a:r>
+              <a:rPr lang="nl-NL" dirty="0" err="1"/>
+              <a:t>about</a:t>
+            </a:r>
+            <a:r>
+              <a:rPr lang="nl-NL" dirty="0"/>
+              <a:t> </a:t>
+            </a:r>
+            <a:r>
+              <a:rPr lang="nl-NL" dirty="0" err="1"/>
+              <a:t>learning</a:t>
+            </a:r>
+            <a:r>
+              <a:rPr lang="nl-NL" dirty="0"/>
+              <a:t> </a:t>
+            </a:r>
+            <a:r>
+              <a:rPr lang="nl-NL" dirty="0" err="1"/>
+              <a:t>and</a:t>
+            </a:r>
+            <a:r>
+              <a:rPr lang="nl-NL" dirty="0"/>
+              <a:t> </a:t>
+            </a:r>
+            <a:r>
+              <a:rPr lang="nl-NL" dirty="0" err="1"/>
+              <a:t>ideas</a:t>
+            </a:r>
+            <a:r>
+              <a:rPr lang="nl-NL" dirty="0"/>
+              <a:t> </a:t>
+            </a:r>
+            <a:r>
+              <a:rPr lang="nl-NL" dirty="0" err="1"/>
+              <a:t>how</a:t>
+            </a:r>
+            <a:r>
+              <a:rPr lang="nl-NL" dirty="0"/>
+              <a:t> </a:t>
+            </a:r>
+            <a:r>
+              <a:rPr lang="nl-NL" dirty="0" err="1"/>
+              <a:t>to</a:t>
+            </a:r>
+            <a:r>
+              <a:rPr lang="nl-NL" dirty="0"/>
+              <a:t> </a:t>
+            </a:r>
+            <a:r>
+              <a:rPr lang="nl-NL" dirty="0" err="1"/>
+              <a:t>procede</a:t>
+            </a:r>
+            <a:r>
+              <a:rPr lang="nl-NL" dirty="0"/>
+              <a:t>.</a:t>
+            </a:r>
+          </a:p>
+          <a:p>
+            <a:pPr marL="171450" indent="-171450">
+              <a:buFontTx/>
+              <a:buChar char="-"/>
+            </a:pPr>
+            <a:r>
+              <a:rPr lang="nl-NL" dirty="0"/>
+              <a:t>Hope </a:t>
+            </a:r>
+            <a:r>
+              <a:rPr lang="nl-NL" dirty="0" err="1"/>
+              <a:t>to</a:t>
+            </a:r>
+            <a:r>
+              <a:rPr lang="nl-NL" dirty="0"/>
+              <a:t> </a:t>
+            </a:r>
+            <a:r>
+              <a:rPr lang="nl-NL" dirty="0" err="1"/>
+              <a:t>use</a:t>
+            </a:r>
+            <a:r>
+              <a:rPr lang="nl-NL" dirty="0"/>
+              <a:t> in </a:t>
+            </a:r>
+            <a:r>
+              <a:rPr lang="nl-NL" dirty="0" err="1"/>
+              <a:t>the</a:t>
+            </a:r>
+            <a:r>
+              <a:rPr lang="nl-NL" dirty="0"/>
+              <a:t> </a:t>
+            </a:r>
+            <a:r>
+              <a:rPr lang="nl-NL" dirty="0" err="1"/>
+              <a:t>future</a:t>
+            </a:r>
+            <a:endParaRPr lang="nl-NL" dirty="0"/>
+          </a:p>
+          <a:p>
+            <a:pPr marL="171450" indent="-171450">
+              <a:buFontTx/>
+              <a:buChar char="-"/>
+            </a:pPr>
+            <a:endParaRPr lang="nl-NL" dirty="0"/>
+          </a:p>
+          <a:p>
+            <a:pPr marL="171450" indent="-171450">
+              <a:buFontTx/>
+              <a:buChar char="-"/>
+            </a:pPr>
+            <a:endParaRPr lang="nl-NL" dirty="0"/>
+          </a:p>
+          <a:p>
+            <a:pPr marL="171450" indent="-171450">
+              <a:buFontTx/>
+              <a:buChar char="-"/>
+            </a:pPr>
+            <a:endParaRPr lang="nl-NL" dirty="0"/>
+          </a:p>
+          <a:p>
+            <a:pPr marL="171450" indent="-171450">
+              <a:buFontTx/>
+              <a:buChar char="-"/>
+            </a:pPr>
+            <a:endParaRPr lang="nl-NL" dirty="0"/>
+          </a:p>
+          <a:p>
+            <a:pPr marL="171450" indent="-171450">
+              <a:buFontTx/>
+              <a:buChar char="-"/>
+            </a:pPr>
+            <a:endParaRPr lang="nl-NL" dirty="0"/>
           </a:p>
           <a:p>
             <a:pPr marL="0" indent="0">
@@ -5565,6 +6505,25 @@
                     <a:ea typeface="Tahoma" panose="020B0604030504040204" pitchFamily="34" charset="0"/>
                     <a:cs typeface="Tahoma" panose="020B0604030504040204" pitchFamily="34" charset="0"/>
                   </a:rPr>
+                  <a:t>A2C/A3C:	Similar learning curve</a:t>
+                </a:r>
+                <a:endParaRPr lang="en-US" sz="1600" dirty="0">
+                  <a:latin typeface="Tahoma" panose="020B0604030504040204" pitchFamily="34" charset="0"/>
+                  <a:ea typeface="Tahoma" panose="020B0604030504040204" pitchFamily="34" charset="0"/>
+                  <a:cs typeface="Tahoma" panose="020B0604030504040204" pitchFamily="34" charset="0"/>
+                </a:endParaRPr>
+              </a:p>
+              <a:p>
+                <a:pPr marL="285750" indent="-285750">
+                  <a:buFont typeface="Arial" panose="020B0604020202020204" pitchFamily="34" charset="0"/>
+                  <a:buChar char="•"/>
+                </a:pPr>
+                <a:r>
+                  <a:rPr lang="en-US" sz="1200" dirty="0">
+                    <a:latin typeface="Tahoma" panose="020B0604030504040204" pitchFamily="34" charset="0"/>
+                    <a:ea typeface="Tahoma" panose="020B0604030504040204" pitchFamily="34" charset="0"/>
+                    <a:cs typeface="Tahoma" panose="020B0604030504040204" pitchFamily="34" charset="0"/>
+                  </a:rPr>
                   <a:t>Batch size: 	Scenario dependent, larger than 10</a:t>
                 </a:r>
               </a:p>
@@ -5597,25 +6556,6 @@
                   </a:rPr>
                   <a:t> and SGD</a:t>
                 </a:r>
-              </a:p>
-              <a:p>
-                <a:pPr marL="285750" indent="-285750">
-                  <a:buFont typeface="Arial" panose="020B0604020202020204" pitchFamily="34" charset="0"/>
-                  <a:buChar char="•"/>
-                </a:pPr>
-                <a:r>
-                  <a:rPr lang="en-US" sz="1200" dirty="0">
-                    <a:latin typeface="Tahoma" panose="020B0604030504040204" pitchFamily="34" charset="0"/>
-                    <a:ea typeface="Tahoma" panose="020B0604030504040204" pitchFamily="34" charset="0"/>
-                    <a:cs typeface="Tahoma" panose="020B0604030504040204" pitchFamily="34" charset="0"/>
-                  </a:rPr>
-                  <a:t>A2C/A3C:	Similar learning curve</a:t>
-                </a:r>
-                <a:endParaRPr lang="en-US" sz="1600" dirty="0">
-                  <a:latin typeface="Tahoma" panose="020B0604030504040204" pitchFamily="34" charset="0"/>
-                  <a:ea typeface="Tahoma" panose="020B0604030504040204" pitchFamily="34" charset="0"/>
-                  <a:cs typeface="Tahoma" panose="020B0604030504040204" pitchFamily="34" charset="0"/>
-                </a:endParaRPr>
               </a:p>
               <a:p>
                 <a:pPr>

</xml_diff>